<commit_message>
edits to the pdf creation
</commit_message>
<xml_diff>
--- a/qgis/generateLegend.pptx
+++ b/qgis/generateLegend.pptx
@@ -270,7 +270,7 @@
           <a:p>
             <a:fld id="{062E0299-C2EB-4534-B52C-7E37CFA382B7}" type="datetimeFigureOut">
               <a:rPr lang="en-US" smtClean="0"/>
-              <a:t>9/8/2023</a:t>
+              <a:t>9/22/2023</a:t>
             </a:fld>
             <a:endParaRPr lang="en-US"/>
           </a:p>
@@ -468,7 +468,7 @@
           <a:p>
             <a:fld id="{062E0299-C2EB-4534-B52C-7E37CFA382B7}" type="datetimeFigureOut">
               <a:rPr lang="en-US" smtClean="0"/>
-              <a:t>9/8/2023</a:t>
+              <a:t>9/22/2023</a:t>
             </a:fld>
             <a:endParaRPr lang="en-US"/>
           </a:p>
@@ -676,7 +676,7 @@
           <a:p>
             <a:fld id="{062E0299-C2EB-4534-B52C-7E37CFA382B7}" type="datetimeFigureOut">
               <a:rPr lang="en-US" smtClean="0"/>
-              <a:t>9/8/2023</a:t>
+              <a:t>9/22/2023</a:t>
             </a:fld>
             <a:endParaRPr lang="en-US"/>
           </a:p>
@@ -874,7 +874,7 @@
           <a:p>
             <a:fld id="{062E0299-C2EB-4534-B52C-7E37CFA382B7}" type="datetimeFigureOut">
               <a:rPr lang="en-US" smtClean="0"/>
-              <a:t>9/8/2023</a:t>
+              <a:t>9/22/2023</a:t>
             </a:fld>
             <a:endParaRPr lang="en-US"/>
           </a:p>
@@ -1149,7 +1149,7 @@
           <a:p>
             <a:fld id="{062E0299-C2EB-4534-B52C-7E37CFA382B7}" type="datetimeFigureOut">
               <a:rPr lang="en-US" smtClean="0"/>
-              <a:t>9/8/2023</a:t>
+              <a:t>9/22/2023</a:t>
             </a:fld>
             <a:endParaRPr lang="en-US"/>
           </a:p>
@@ -1414,7 +1414,7 @@
           <a:p>
             <a:fld id="{062E0299-C2EB-4534-B52C-7E37CFA382B7}" type="datetimeFigureOut">
               <a:rPr lang="en-US" smtClean="0"/>
-              <a:t>9/8/2023</a:t>
+              <a:t>9/22/2023</a:t>
             </a:fld>
             <a:endParaRPr lang="en-US"/>
           </a:p>
@@ -1826,7 +1826,7 @@
           <a:p>
             <a:fld id="{062E0299-C2EB-4534-B52C-7E37CFA382B7}" type="datetimeFigureOut">
               <a:rPr lang="en-US" smtClean="0"/>
-              <a:t>9/8/2023</a:t>
+              <a:t>9/22/2023</a:t>
             </a:fld>
             <a:endParaRPr lang="en-US"/>
           </a:p>
@@ -1967,7 +1967,7 @@
           <a:p>
             <a:fld id="{062E0299-C2EB-4534-B52C-7E37CFA382B7}" type="datetimeFigureOut">
               <a:rPr lang="en-US" smtClean="0"/>
-              <a:t>9/8/2023</a:t>
+              <a:t>9/22/2023</a:t>
             </a:fld>
             <a:endParaRPr lang="en-US"/>
           </a:p>
@@ -2080,7 +2080,7 @@
           <a:p>
             <a:fld id="{062E0299-C2EB-4534-B52C-7E37CFA382B7}" type="datetimeFigureOut">
               <a:rPr lang="en-US" smtClean="0"/>
-              <a:t>9/8/2023</a:t>
+              <a:t>9/22/2023</a:t>
             </a:fld>
             <a:endParaRPr lang="en-US"/>
           </a:p>
@@ -2391,7 +2391,7 @@
           <a:p>
             <a:fld id="{062E0299-C2EB-4534-B52C-7E37CFA382B7}" type="datetimeFigureOut">
               <a:rPr lang="en-US" smtClean="0"/>
-              <a:t>9/8/2023</a:t>
+              <a:t>9/22/2023</a:t>
             </a:fld>
             <a:endParaRPr lang="en-US"/>
           </a:p>
@@ -2679,7 +2679,7 @@
           <a:p>
             <a:fld id="{062E0299-C2EB-4534-B52C-7E37CFA382B7}" type="datetimeFigureOut">
               <a:rPr lang="en-US" smtClean="0"/>
-              <a:t>9/8/2023</a:t>
+              <a:t>9/22/2023</a:t>
             </a:fld>
             <a:endParaRPr lang="en-US"/>
           </a:p>
@@ -2920,7 +2920,7 @@
           <a:p>
             <a:fld id="{062E0299-C2EB-4534-B52C-7E37CFA382B7}" type="datetimeFigureOut">
               <a:rPr lang="en-US" smtClean="0"/>
-              <a:t>9/8/2023</a:t>
+              <a:t>9/22/2023</a:t>
             </a:fld>
             <a:endParaRPr lang="en-US"/>
           </a:p>
@@ -3481,7 +3481,7 @@
           <p:spPr>
             <a:xfrm>
               <a:off x="5125215" y="1122363"/>
-              <a:ext cx="1499641" cy="369332"/>
+              <a:ext cx="1499641" cy="646331"/>
             </a:xfrm>
             <a:prstGeom prst="rect">
               <a:avLst/>
@@ -3496,8 +3496,11 @@
             <a:p>
               <a:r>
                 <a:rPr lang="en-US" dirty="0"/>
-                <a:t>1.00</a:t>
+                <a:t>0.94</a:t>
               </a:r>
+            </a:p>
+            <a:p>
+              <a:endParaRPr lang="en-US" dirty="0"/>
             </a:p>
           </p:txBody>
         </p:sp>
@@ -3516,7 +3519,7 @@
           <p:spPr>
             <a:xfrm>
               <a:off x="5125215" y="1563505"/>
-              <a:ext cx="1499641" cy="369332"/>
+              <a:ext cx="1499641" cy="646331"/>
             </a:xfrm>
             <a:prstGeom prst="rect">
               <a:avLst/>
@@ -3531,8 +3534,11 @@
             <a:p>
               <a:r>
                 <a:rPr lang="en-US" dirty="0"/>
-                <a:t>0.80</a:t>
+                <a:t>0.74</a:t>
               </a:r>
+            </a:p>
+            <a:p>
+              <a:endParaRPr lang="en-US" dirty="0"/>
             </a:p>
           </p:txBody>
         </p:sp>
@@ -3566,7 +3572,7 @@
             <a:p>
               <a:r>
                 <a:rPr lang="en-US" dirty="0"/>
-                <a:t>0.65</a:t>
+                <a:t>0.55</a:t>
               </a:r>
             </a:p>
           </p:txBody>
@@ -3601,7 +3607,7 @@
             <a:p>
               <a:r>
                 <a:rPr lang="en-US" dirty="0"/>
-                <a:t>0.50</a:t>
+                <a:t>0.32</a:t>
               </a:r>
             </a:p>
           </p:txBody>
@@ -3636,7 +3642,7 @@
             <a:p>
               <a:r>
                 <a:rPr lang="en-US" dirty="0"/>
-                <a:t>0.35</a:t>
+                <a:t>0.16</a:t>
               </a:r>
             </a:p>
           </p:txBody>

</xml_diff>